<commit_message>
updated slides for repos and DMPs
</commit_message>
<xml_diff>
--- a/instructors/13-Repositories_v2.0.pptx
+++ b/instructors/13-Repositories_v2.0.pptx
@@ -5,7 +5,7 @@
     <p:sldMasterId id="2147483648" r:id="rId1"/>
   </p:sldMasterIdLst>
   <p:notesMasterIdLst>
-    <p:notesMasterId r:id="rId29"/>
+    <p:notesMasterId r:id="rId30"/>
   </p:notesMasterIdLst>
   <p:sldIdLst>
     <p:sldId id="280" r:id="rId2"/>
@@ -33,8 +33,9 @@
     <p:sldId id="304" r:id="rId24"/>
     <p:sldId id="307" r:id="rId25"/>
     <p:sldId id="318" r:id="rId26"/>
-    <p:sldId id="306" r:id="rId27"/>
-    <p:sldId id="296" r:id="rId28"/>
+    <p:sldId id="319" r:id="rId27"/>
+    <p:sldId id="306" r:id="rId28"/>
+    <p:sldId id="296" r:id="rId29"/>
   </p:sldIdLst>
   <p:sldSz cx="12192000" cy="6858000"/>
   <p:notesSz cx="6858000" cy="9144000"/>
@@ -223,7 +224,7 @@
           <a:p>
             <a:fld id="{585C48AE-4A1E-9A43-835F-510354165F99}" type="datetimeFigureOut">
               <a:rPr lang="en-GB" smtClean="0"/>
-              <a:t>20/10/2021</a:t>
+              <a:t>21/10/2021</a:t>
             </a:fld>
             <a:endParaRPr lang="en-GB"/>
           </a:p>
@@ -639,7 +640,7 @@
           <a:p>
             <a:fld id="{5913FB77-D8DB-4AB9-8EA5-EE8C3B57A5E1}" type="datetimeFigureOut">
               <a:rPr lang="en-GB" smtClean="0"/>
-              <a:t>20/10/2021</a:t>
+              <a:t>21/10/2021</a:t>
             </a:fld>
             <a:endParaRPr lang="en-GB"/>
           </a:p>
@@ -886,7 +887,7 @@
           <a:p>
             <a:fld id="{5913FB77-D8DB-4AB9-8EA5-EE8C3B57A5E1}" type="datetimeFigureOut">
               <a:rPr lang="en-GB" smtClean="0"/>
-              <a:t>20/10/2021</a:t>
+              <a:t>21/10/2021</a:t>
             </a:fld>
             <a:endParaRPr lang="en-GB"/>
           </a:p>
@@ -1096,7 +1097,7 @@
           <a:p>
             <a:fld id="{5913FB77-D8DB-4AB9-8EA5-EE8C3B57A5E1}" type="datetimeFigureOut">
               <a:rPr lang="en-GB" smtClean="0"/>
-              <a:t>20/10/2021</a:t>
+              <a:t>21/10/2021</a:t>
             </a:fld>
             <a:endParaRPr lang="en-GB"/>
           </a:p>
@@ -1296,7 +1297,7 @@
           <a:p>
             <a:fld id="{5913FB77-D8DB-4AB9-8EA5-EE8C3B57A5E1}" type="datetimeFigureOut">
               <a:rPr lang="en-GB" smtClean="0"/>
-              <a:t>20/10/2021</a:t>
+              <a:t>21/10/2021</a:t>
             </a:fld>
             <a:endParaRPr lang="en-GB"/>
           </a:p>
@@ -1572,7 +1573,7 @@
           <a:p>
             <a:fld id="{5913FB77-D8DB-4AB9-8EA5-EE8C3B57A5E1}" type="datetimeFigureOut">
               <a:rPr lang="en-GB" smtClean="0"/>
-              <a:t>20/10/2021</a:t>
+              <a:t>21/10/2021</a:t>
             </a:fld>
             <a:endParaRPr lang="en-GB"/>
           </a:p>
@@ -1840,7 +1841,7 @@
           <a:p>
             <a:fld id="{5913FB77-D8DB-4AB9-8EA5-EE8C3B57A5E1}" type="datetimeFigureOut">
               <a:rPr lang="en-GB" smtClean="0"/>
-              <a:t>20/10/2021</a:t>
+              <a:t>21/10/2021</a:t>
             </a:fld>
             <a:endParaRPr lang="en-GB"/>
           </a:p>
@@ -2255,7 +2256,7 @@
           <a:p>
             <a:fld id="{5913FB77-D8DB-4AB9-8EA5-EE8C3B57A5E1}" type="datetimeFigureOut">
               <a:rPr lang="en-GB" smtClean="0"/>
-              <a:t>20/10/2021</a:t>
+              <a:t>21/10/2021</a:t>
             </a:fld>
             <a:endParaRPr lang="en-GB"/>
           </a:p>
@@ -2397,7 +2398,7 @@
           <a:p>
             <a:fld id="{5913FB77-D8DB-4AB9-8EA5-EE8C3B57A5E1}" type="datetimeFigureOut">
               <a:rPr lang="en-GB" smtClean="0"/>
-              <a:t>20/10/2021</a:t>
+              <a:t>21/10/2021</a:t>
             </a:fld>
             <a:endParaRPr lang="en-GB"/>
           </a:p>
@@ -2510,7 +2511,7 @@
           <a:p>
             <a:fld id="{5913FB77-D8DB-4AB9-8EA5-EE8C3B57A5E1}" type="datetimeFigureOut">
               <a:rPr lang="en-GB" smtClean="0"/>
-              <a:t>20/10/2021</a:t>
+              <a:t>21/10/2021</a:t>
             </a:fld>
             <a:endParaRPr lang="en-GB"/>
           </a:p>
@@ -2823,7 +2824,7 @@
           <a:p>
             <a:fld id="{5913FB77-D8DB-4AB9-8EA5-EE8C3B57A5E1}" type="datetimeFigureOut">
               <a:rPr lang="en-GB" smtClean="0"/>
-              <a:t>20/10/2021</a:t>
+              <a:t>21/10/2021</a:t>
             </a:fld>
             <a:endParaRPr lang="en-GB"/>
           </a:p>
@@ -3112,7 +3113,7 @@
           <a:p>
             <a:fld id="{5913FB77-D8DB-4AB9-8EA5-EE8C3B57A5E1}" type="datetimeFigureOut">
               <a:rPr lang="en-GB" smtClean="0"/>
-              <a:t>20/10/2021</a:t>
+              <a:t>21/10/2021</a:t>
             </a:fld>
             <a:endParaRPr lang="en-GB"/>
           </a:p>
@@ -3354,7 +3355,7 @@
             <a:fld id="{5913FB77-D8DB-4AB9-8EA5-EE8C3B57A5E1}" type="datetimeFigureOut">
               <a:rPr lang="en-GB" smtClean="0"/>
               <a:pPr/>
-              <a:t>20/10/2021</a:t>
+              <a:t>21/10/2021</a:t>
             </a:fld>
             <a:endParaRPr lang="en-GB"/>
           </a:p>
@@ -4584,27 +4585,7 @@
                 <a:effectLst/>
                 <a:latin typeface="Ubuntu"/>
               </a:rPr>
-              <a:t>However, it is not good for </a:t>
-            </a:r>
-            <a:r>
-              <a:rPr lang="en-GB" sz="2400" b="0" i="0" dirty="0" err="1">
-                <a:solidFill>
-                  <a:srgbClr val="333333"/>
-                </a:solidFill>
-                <a:effectLst/>
-                <a:latin typeface="Ubuntu"/>
-              </a:rPr>
-              <a:t>disovery</a:t>
-            </a:r>
-            <a:r>
-              <a:rPr lang="en-GB" sz="2400" b="0" i="0" dirty="0">
-                <a:solidFill>
-                  <a:srgbClr val="333333"/>
-                </a:solidFill>
-                <a:effectLst/>
-                <a:latin typeface="Ubuntu"/>
-              </a:rPr>
-              <a:t>, and does not enforce most metadata!</a:t>
+              <a:t>However, it is not good for discovery, and does not enforce most metadata!</a:t>
             </a:r>
             <a:endParaRPr lang="en-GB" sz="2400" dirty="0"/>
           </a:p>
@@ -8120,6 +8101,296 @@
           <a:chExt cx="0" cy="0"/>
         </a:xfrm>
       </p:grpSpPr>
+      <p:sp>
+        <p:nvSpPr>
+          <p:cNvPr id="2" name="Title 1">
+            <a:extLst>
+              <a:ext uri="{FF2B5EF4-FFF2-40B4-BE49-F238E27FC236}">
+                <a16:creationId xmlns:a16="http://schemas.microsoft.com/office/drawing/2014/main" id="{0644B4C3-AD1C-4994-814E-0100950A4C17}"/>
+              </a:ext>
+            </a:extLst>
+          </p:cNvPr>
+          <p:cNvSpPr>
+            <a:spLocks noGrp="1"/>
+          </p:cNvSpPr>
+          <p:nvPr>
+            <p:ph type="title"/>
+          </p:nvPr>
+        </p:nvSpPr>
+        <p:spPr>
+          <a:xfrm>
+            <a:off x="305637" y="180211"/>
+            <a:ext cx="10515600" cy="1325563"/>
+          </a:xfrm>
+        </p:spPr>
+        <p:txBody>
+          <a:bodyPr/>
+          <a:lstStyle/>
+          <a:p>
+            <a:r>
+              <a:rPr lang="en-GB" dirty="0"/>
+              <a:t>What about the ReadMe file?</a:t>
+            </a:r>
+          </a:p>
+        </p:txBody>
+      </p:sp>
+      <p:sp>
+        <p:nvSpPr>
+          <p:cNvPr id="5" name="TextBox 4">
+            <a:extLst>
+              <a:ext uri="{FF2B5EF4-FFF2-40B4-BE49-F238E27FC236}">
+                <a16:creationId xmlns:a16="http://schemas.microsoft.com/office/drawing/2014/main" id="{1EF43E33-0E7B-4B21-9546-9C820EA0355B}"/>
+              </a:ext>
+            </a:extLst>
+          </p:cNvPr>
+          <p:cNvSpPr txBox="1"/>
+          <p:nvPr/>
+        </p:nvSpPr>
+        <p:spPr>
+          <a:xfrm>
+            <a:off x="2766714" y="2228671"/>
+            <a:ext cx="6296130" cy="1200329"/>
+          </a:xfrm>
+          <a:prstGeom prst="rect">
+            <a:avLst/>
+          </a:prstGeom>
+          <a:solidFill>
+            <a:schemeClr val="accent1">
+              <a:lumMod val="20000"/>
+              <a:lumOff val="80000"/>
+            </a:schemeClr>
+          </a:solidFill>
+        </p:spPr>
+        <p:txBody>
+          <a:bodyPr wrap="square">
+            <a:spAutoFit/>
+          </a:bodyPr>
+          <a:lstStyle/>
+          <a:p>
+            <a:pPr algn="ctr"/>
+            <a:r>
+              <a:rPr lang="en-GB" sz="2400" b="0" i="0" dirty="0">
+                <a:solidFill>
+                  <a:srgbClr val="333333"/>
+                </a:solidFill>
+                <a:effectLst/>
+                <a:latin typeface="Ubuntu"/>
+              </a:rPr>
+              <a:t>Always include a ReadMe file when you deposit in “General” research data public repositories, such as </a:t>
+            </a:r>
+            <a:r>
+              <a:rPr lang="en-GB" sz="2400" b="0" i="0" dirty="0" err="1">
+                <a:solidFill>
+                  <a:srgbClr val="333333"/>
+                </a:solidFill>
+                <a:effectLst/>
+                <a:latin typeface="Ubuntu"/>
+              </a:rPr>
+              <a:t>DataShare</a:t>
+            </a:r>
+            <a:r>
+              <a:rPr lang="en-GB" sz="2400" b="0" i="0" dirty="0">
+                <a:solidFill>
+                  <a:srgbClr val="333333"/>
+                </a:solidFill>
+                <a:effectLst/>
+                <a:latin typeface="Ubuntu"/>
+              </a:rPr>
+              <a:t> or </a:t>
+            </a:r>
+            <a:r>
+              <a:rPr lang="en-GB" sz="2400" b="0" i="0" dirty="0" err="1">
+                <a:solidFill>
+                  <a:srgbClr val="333333"/>
+                </a:solidFill>
+                <a:effectLst/>
+                <a:latin typeface="Ubuntu"/>
+              </a:rPr>
+              <a:t>Zenodo</a:t>
+            </a:r>
+            <a:r>
+              <a:rPr lang="en-GB" sz="2400" b="0" i="0" dirty="0">
+                <a:solidFill>
+                  <a:srgbClr val="333333"/>
+                </a:solidFill>
+                <a:effectLst/>
+                <a:latin typeface="Ubuntu"/>
+              </a:rPr>
+              <a:t>.</a:t>
+            </a:r>
+            <a:endParaRPr lang="en-GB" sz="2400" dirty="0"/>
+          </a:p>
+        </p:txBody>
+      </p:sp>
+      <p:sp>
+        <p:nvSpPr>
+          <p:cNvPr id="16" name="TextBox 15">
+            <a:extLst>
+              <a:ext uri="{FF2B5EF4-FFF2-40B4-BE49-F238E27FC236}">
+                <a16:creationId xmlns:a16="http://schemas.microsoft.com/office/drawing/2014/main" id="{F48D18B6-429B-4ACA-B9AC-8341B6F657F3}"/>
+              </a:ext>
+            </a:extLst>
+          </p:cNvPr>
+          <p:cNvSpPr txBox="1"/>
+          <p:nvPr/>
+        </p:nvSpPr>
+        <p:spPr>
+          <a:xfrm>
+            <a:off x="7523922" y="4444831"/>
+            <a:ext cx="6094324" cy="369332"/>
+          </a:xfrm>
+          <a:prstGeom prst="rect">
+            <a:avLst/>
+          </a:prstGeom>
+          <a:noFill/>
+        </p:spPr>
+        <p:txBody>
+          <a:bodyPr wrap="square">
+            <a:spAutoFit/>
+          </a:bodyPr>
+          <a:lstStyle/>
+          <a:p>
+            <a:r>
+              <a:rPr lang="en-GB" dirty="0">
+                <a:hlinkClick r:id="rId2"/>
+              </a:rPr>
+              <a:t>https://www.wiki.ed.ac.uk/x/XbRVHQ</a:t>
+            </a:r>
+            <a:r>
+              <a:rPr lang="en-GB" dirty="0"/>
+              <a:t> </a:t>
+            </a:r>
+          </a:p>
+        </p:txBody>
+      </p:sp>
+      <p:sp>
+        <p:nvSpPr>
+          <p:cNvPr id="8" name="TextBox 7">
+            <a:extLst>
+              <a:ext uri="{FF2B5EF4-FFF2-40B4-BE49-F238E27FC236}">
+                <a16:creationId xmlns:a16="http://schemas.microsoft.com/office/drawing/2014/main" id="{97160006-7E89-4AA4-86CC-F661B527EF12}"/>
+              </a:ext>
+            </a:extLst>
+          </p:cNvPr>
+          <p:cNvSpPr txBox="1"/>
+          <p:nvPr/>
+        </p:nvSpPr>
+        <p:spPr>
+          <a:xfrm>
+            <a:off x="1939332" y="4306332"/>
+            <a:ext cx="3975447" cy="646331"/>
+          </a:xfrm>
+          <a:prstGeom prst="rect">
+            <a:avLst/>
+          </a:prstGeom>
+          <a:noFill/>
+        </p:spPr>
+        <p:txBody>
+          <a:bodyPr wrap="none" rtlCol="0">
+            <a:spAutoFit/>
+          </a:bodyPr>
+          <a:lstStyle/>
+          <a:p>
+            <a:pPr algn="ctr"/>
+            <a:r>
+              <a:rPr lang="en-GB" dirty="0"/>
+              <a:t>An example readme file can be found at </a:t>
+            </a:r>
+          </a:p>
+          <a:p>
+            <a:pPr algn="ctr"/>
+            <a:r>
+              <a:rPr lang="en-GB" dirty="0" err="1"/>
+              <a:t>BioRDM’s</a:t>
+            </a:r>
+            <a:r>
+              <a:rPr lang="en-GB" dirty="0"/>
+              <a:t> Wiki Page for </a:t>
+            </a:r>
+            <a:r>
+              <a:rPr lang="en-GB" dirty="0" err="1"/>
+              <a:t>DataShare</a:t>
+            </a:r>
+            <a:endParaRPr lang="en-GB" dirty="0"/>
+          </a:p>
+        </p:txBody>
+      </p:sp>
+      <p:sp>
+        <p:nvSpPr>
+          <p:cNvPr id="9" name="Arrow: Right 8">
+            <a:extLst>
+              <a:ext uri="{FF2B5EF4-FFF2-40B4-BE49-F238E27FC236}">
+                <a16:creationId xmlns:a16="http://schemas.microsoft.com/office/drawing/2014/main" id="{3FA85775-6AD8-4E37-B1B9-6BAA1BAA3DA0}"/>
+              </a:ext>
+            </a:extLst>
+          </p:cNvPr>
+          <p:cNvSpPr/>
+          <p:nvPr/>
+        </p:nvSpPr>
+        <p:spPr>
+          <a:xfrm>
+            <a:off x="6277223" y="4318612"/>
+            <a:ext cx="884255" cy="621770"/>
+          </a:xfrm>
+          <a:prstGeom prst="rightArrow">
+            <a:avLst/>
+          </a:prstGeom>
+        </p:spPr>
+        <p:style>
+          <a:lnRef idx="2">
+            <a:schemeClr val="accent1">
+              <a:shade val="50000"/>
+            </a:schemeClr>
+          </a:lnRef>
+          <a:fillRef idx="1">
+            <a:schemeClr val="accent1"/>
+          </a:fillRef>
+          <a:effectRef idx="0">
+            <a:schemeClr val="accent1"/>
+          </a:effectRef>
+          <a:fontRef idx="minor">
+            <a:schemeClr val="lt1"/>
+          </a:fontRef>
+        </p:style>
+        <p:txBody>
+          <a:bodyPr rtlCol="0" anchor="ctr"/>
+          <a:lstStyle/>
+          <a:p>
+            <a:pPr algn="ctr"/>
+            <a:endParaRPr lang="en-GB"/>
+          </a:p>
+        </p:txBody>
+      </p:sp>
+    </p:spTree>
+    <p:extLst>
+      <p:ext uri="{BB962C8B-B14F-4D97-AF65-F5344CB8AC3E}">
+        <p14:creationId xmlns:p14="http://schemas.microsoft.com/office/powerpoint/2010/main" val="1507444769"/>
+      </p:ext>
+    </p:extLst>
+  </p:cSld>
+  <p:clrMapOvr>
+    <a:masterClrMapping/>
+  </p:clrMapOvr>
+</p:sld>
+</file>
+
+<file path=ppt/slides/slide27.xml><?xml version="1.0" encoding="utf-8"?>
+<p:sld xmlns:a="http://schemas.openxmlformats.org/drawingml/2006/main" xmlns:r="http://schemas.openxmlformats.org/officeDocument/2006/relationships" xmlns:p="http://schemas.openxmlformats.org/presentationml/2006/main">
+  <p:cSld>
+    <p:spTree>
+      <p:nvGrpSpPr>
+        <p:cNvPr id="1" name=""/>
+        <p:cNvGrpSpPr/>
+        <p:nvPr/>
+      </p:nvGrpSpPr>
+      <p:grpSpPr>
+        <a:xfrm>
+          <a:off x="0" y="0"/>
+          <a:ext cx="0" cy="0"/>
+          <a:chOff x="0" y="0"/>
+          <a:chExt cx="0" cy="0"/>
+        </a:xfrm>
+      </p:grpSpPr>
       <p:pic>
         <p:nvPicPr>
           <p:cNvPr id="4" name="Picture 2" descr="Ed_DaSH">
@@ -8320,7 +8591,7 @@
 </p:sld>
 </file>
 
-<file path=ppt/slides/slide27.xml><?xml version="1.0" encoding="utf-8"?>
+<file path=ppt/slides/slide28.xml><?xml version="1.0" encoding="utf-8"?>
 <p:sld xmlns:a="http://schemas.openxmlformats.org/drawingml/2006/main" xmlns:r="http://schemas.openxmlformats.org/officeDocument/2006/relationships" xmlns:p="http://schemas.openxmlformats.org/presentationml/2006/main">
   <p:cSld>
     <p:spTree>

</xml_diff>